<commit_message>
updates to summary fig
</commit_message>
<xml_diff>
--- a/Figures/Figure2/fig 2 formatting.pptx
+++ b/Figures/Figure2/fig 2 formatting.pptx
@@ -104,6 +104,11 @@
       </a:defRPr>
     </a:lvl9pPr>
   </p:defaultTextStyle>
+  <p:extLst>
+    <p:ext uri="{EFAFB233-063F-42B5-8137-9DF3F51BA10A}">
+      <p15:sldGuideLst xmlns:p15="http://schemas.microsoft.com/office/powerpoint/2012/main"/>
+    </p:ext>
+  </p:extLst>
 </p:presentation>
 </file>
 
@@ -254,7 +259,7 @@
           <a:p>
             <a:fld id="{9C50F785-C80D-4A53-AFFE-8911002EEBDB}" type="datetimeFigureOut">
               <a:rPr lang="en-US" smtClean="0"/>
-              <a:t>3/4/2024</a:t>
+              <a:t>3/7/2024</a:t>
             </a:fld>
             <a:endParaRPr lang="en-US"/>
           </a:p>
@@ -452,7 +457,7 @@
           <a:p>
             <a:fld id="{9C50F785-C80D-4A53-AFFE-8911002EEBDB}" type="datetimeFigureOut">
               <a:rPr lang="en-US" smtClean="0"/>
-              <a:t>3/4/2024</a:t>
+              <a:t>3/7/2024</a:t>
             </a:fld>
             <a:endParaRPr lang="en-US"/>
           </a:p>
@@ -660,7 +665,7 @@
           <a:p>
             <a:fld id="{9C50F785-C80D-4A53-AFFE-8911002EEBDB}" type="datetimeFigureOut">
               <a:rPr lang="en-US" smtClean="0"/>
-              <a:t>3/4/2024</a:t>
+              <a:t>3/7/2024</a:t>
             </a:fld>
             <a:endParaRPr lang="en-US"/>
           </a:p>
@@ -858,7 +863,7 @@
           <a:p>
             <a:fld id="{9C50F785-C80D-4A53-AFFE-8911002EEBDB}" type="datetimeFigureOut">
               <a:rPr lang="en-US" smtClean="0"/>
-              <a:t>3/4/2024</a:t>
+              <a:t>3/7/2024</a:t>
             </a:fld>
             <a:endParaRPr lang="en-US"/>
           </a:p>
@@ -1133,7 +1138,7 @@
           <a:p>
             <a:fld id="{9C50F785-C80D-4A53-AFFE-8911002EEBDB}" type="datetimeFigureOut">
               <a:rPr lang="en-US" smtClean="0"/>
-              <a:t>3/4/2024</a:t>
+              <a:t>3/7/2024</a:t>
             </a:fld>
             <a:endParaRPr lang="en-US"/>
           </a:p>
@@ -1398,7 +1403,7 @@
           <a:p>
             <a:fld id="{9C50F785-C80D-4A53-AFFE-8911002EEBDB}" type="datetimeFigureOut">
               <a:rPr lang="en-US" smtClean="0"/>
-              <a:t>3/4/2024</a:t>
+              <a:t>3/7/2024</a:t>
             </a:fld>
             <a:endParaRPr lang="en-US"/>
           </a:p>
@@ -1810,7 +1815,7 @@
           <a:p>
             <a:fld id="{9C50F785-C80D-4A53-AFFE-8911002EEBDB}" type="datetimeFigureOut">
               <a:rPr lang="en-US" smtClean="0"/>
-              <a:t>3/4/2024</a:t>
+              <a:t>3/7/2024</a:t>
             </a:fld>
             <a:endParaRPr lang="en-US"/>
           </a:p>
@@ -1951,7 +1956,7 @@
           <a:p>
             <a:fld id="{9C50F785-C80D-4A53-AFFE-8911002EEBDB}" type="datetimeFigureOut">
               <a:rPr lang="en-US" smtClean="0"/>
-              <a:t>3/4/2024</a:t>
+              <a:t>3/7/2024</a:t>
             </a:fld>
             <a:endParaRPr lang="en-US"/>
           </a:p>
@@ -2064,7 +2069,7 @@
           <a:p>
             <a:fld id="{9C50F785-C80D-4A53-AFFE-8911002EEBDB}" type="datetimeFigureOut">
               <a:rPr lang="en-US" smtClean="0"/>
-              <a:t>3/4/2024</a:t>
+              <a:t>3/7/2024</a:t>
             </a:fld>
             <a:endParaRPr lang="en-US"/>
           </a:p>
@@ -2375,7 +2380,7 @@
           <a:p>
             <a:fld id="{9C50F785-C80D-4A53-AFFE-8911002EEBDB}" type="datetimeFigureOut">
               <a:rPr lang="en-US" smtClean="0"/>
-              <a:t>3/4/2024</a:t>
+              <a:t>3/7/2024</a:t>
             </a:fld>
             <a:endParaRPr lang="en-US"/>
           </a:p>
@@ -2663,7 +2668,7 @@
           <a:p>
             <a:fld id="{9C50F785-C80D-4A53-AFFE-8911002EEBDB}" type="datetimeFigureOut">
               <a:rPr lang="en-US" smtClean="0"/>
-              <a:t>3/4/2024</a:t>
+              <a:t>3/7/2024</a:t>
             </a:fld>
             <a:endParaRPr lang="en-US"/>
           </a:p>
@@ -2904,7 +2909,7 @@
           <a:p>
             <a:fld id="{9C50F785-C80D-4A53-AFFE-8911002EEBDB}" type="datetimeFigureOut">
               <a:rPr lang="en-US" smtClean="0"/>
-              <a:t>3/4/2024</a:t>
+              <a:t>3/7/2024</a:t>
             </a:fld>
             <a:endParaRPr lang="en-US"/>
           </a:p>
@@ -3323,10 +3328,10 @@
       </p:grpSpPr>
       <p:grpSp>
         <p:nvGrpSpPr>
-          <p:cNvPr id="50" name="Group 49">
-            <a:extLst>
-              <a:ext uri="{FF2B5EF4-FFF2-40B4-BE49-F238E27FC236}">
-                <a16:creationId xmlns:a16="http://schemas.microsoft.com/office/drawing/2014/main" id="{C4EF7049-4569-4B6C-2E27-A36ADB7E2F9D}"/>
+          <p:cNvPr id="22" name="Group 21">
+            <a:extLst>
+              <a:ext uri="{FF2B5EF4-FFF2-40B4-BE49-F238E27FC236}">
+                <a16:creationId xmlns:a16="http://schemas.microsoft.com/office/drawing/2014/main" id="{DEC5A411-CA96-6F25-BB2D-846009BD4421}"/>
               </a:ext>
             </a:extLst>
           </p:cNvPr>
@@ -3335,120 +3340,60 @@
         </p:nvGrpSpPr>
         <p:grpSpPr>
           <a:xfrm>
-            <a:off x="0" y="-114303"/>
-            <a:ext cx="11824335" cy="7086606"/>
-            <a:chOff x="0" y="-114303"/>
-            <a:chExt cx="11824335" cy="7086606"/>
+            <a:off x="-6103" y="-2701"/>
+            <a:ext cx="11726229" cy="7086605"/>
+            <a:chOff x="-6103" y="-2701"/>
+            <a:chExt cx="11726229" cy="7086605"/>
           </a:xfrm>
         </p:grpSpPr>
-        <p:grpSp>
-          <p:nvGrpSpPr>
-            <p:cNvPr id="15" name="Group 14">
+        <p:pic>
+          <p:nvPicPr>
+            <p:cNvPr id="14" name="Picture 13">
               <a:extLst>
                 <a:ext uri="{FF2B5EF4-FFF2-40B4-BE49-F238E27FC236}">
-                  <a16:creationId xmlns:a16="http://schemas.microsoft.com/office/drawing/2014/main" id="{02EAA6B9-61EC-3200-87DA-FFB7F1453B7B}"/>
+                  <a16:creationId xmlns:a16="http://schemas.microsoft.com/office/drawing/2014/main" id="{2B7BA915-479E-9963-414F-9CB3C29133DC}"/>
                 </a:ext>
               </a:extLst>
             </p:cNvPr>
-            <p:cNvGrpSpPr/>
+            <p:cNvPicPr>
+              <a:picLocks noChangeAspect="1"/>
+            </p:cNvPicPr>
             <p:nvPr/>
-          </p:nvGrpSpPr>
-          <p:grpSpPr>
+          </p:nvPicPr>
+          <p:blipFill>
+            <a:blip r:embed="rId2">
+              <a:clrChange>
+                <a:clrFrom>
+                  <a:srgbClr val="FFFFFF"/>
+                </a:clrFrom>
+                <a:clrTo>
+                  <a:srgbClr val="FFFFFF">
+                    <a:alpha val="0"/>
+                  </a:srgbClr>
+                </a:clrTo>
+              </a:clrChange>
+              <a:extLst>
+                <a:ext uri="{28A0092B-C50C-407E-A947-70E740481C1C}">
+                  <a14:useLocalDpi xmlns:a14="http://schemas.microsoft.com/office/drawing/2010/main" val="0"/>
+                </a:ext>
+              </a:extLst>
+            </a:blip>
+            <a:srcRect/>
+            <a:stretch/>
+          </p:blipFill>
+          <p:spPr>
             <a:xfrm>
-              <a:off x="0" y="-114303"/>
-              <a:ext cx="9448808" cy="7086606"/>
-              <a:chOff x="95242" y="0"/>
-              <a:chExt cx="9448808" cy="7086606"/>
+              <a:off x="-6103" y="-2701"/>
+              <a:ext cx="9448808" cy="7086605"/>
             </a:xfrm>
-          </p:grpSpPr>
-          <p:pic>
-            <p:nvPicPr>
-              <p:cNvPr id="14" name="Picture 13" descr="A graph of different colored squares&#10;&#10;Description automatically generated with medium confidence">
-                <a:extLst>
-                  <a:ext uri="{FF2B5EF4-FFF2-40B4-BE49-F238E27FC236}">
-                    <a16:creationId xmlns:a16="http://schemas.microsoft.com/office/drawing/2014/main" id="{2B7BA915-479E-9963-414F-9CB3C29133DC}"/>
-                  </a:ext>
-                </a:extLst>
-              </p:cNvPr>
-              <p:cNvPicPr>
-                <a:picLocks noChangeAspect="1"/>
-              </p:cNvPicPr>
-              <p:nvPr/>
-            </p:nvPicPr>
-            <p:blipFill>
-              <a:blip r:embed="rId2">
-                <a:clrChange>
-                  <a:clrFrom>
-                    <a:srgbClr val="FFFFFF"/>
-                  </a:clrFrom>
-                  <a:clrTo>
-                    <a:srgbClr val="FFFFFF">
-                      <a:alpha val="0"/>
-                    </a:srgbClr>
-                  </a:clrTo>
-                </a:clrChange>
-                <a:extLst>
-                  <a:ext uri="{28A0092B-C50C-407E-A947-70E740481C1C}">
-                    <a14:useLocalDpi xmlns:a14="http://schemas.microsoft.com/office/drawing/2010/main" val="0"/>
-                  </a:ext>
-                </a:extLst>
-              </a:blip>
-              <a:stretch>
-                <a:fillRect/>
-              </a:stretch>
-            </p:blipFill>
-            <p:spPr>
-              <a:xfrm>
-                <a:off x="95242" y="0"/>
-                <a:ext cx="9448808" cy="7086606"/>
-              </a:xfrm>
-              <a:prstGeom prst="rect">
-                <a:avLst/>
-              </a:prstGeom>
-            </p:spPr>
-          </p:pic>
-          <p:sp>
-            <p:nvSpPr>
-              <p:cNvPr id="10" name="TextBox 9">
-                <a:extLst>
-                  <a:ext uri="{FF2B5EF4-FFF2-40B4-BE49-F238E27FC236}">
-                    <a16:creationId xmlns:a16="http://schemas.microsoft.com/office/drawing/2014/main" id="{3C135E18-05C6-2252-3525-03136ABF1E75}"/>
-                  </a:ext>
-                </a:extLst>
-              </p:cNvPr>
-              <p:cNvSpPr txBox="1"/>
-              <p:nvPr/>
-            </p:nvSpPr>
-            <p:spPr>
-              <a:xfrm>
-                <a:off x="3324224" y="6487954"/>
-                <a:ext cx="923925" cy="261610"/>
-              </a:xfrm>
-              <a:prstGeom prst="rect">
-                <a:avLst/>
-              </a:prstGeom>
-              <a:noFill/>
-            </p:spPr>
-            <p:txBody>
-              <a:bodyPr wrap="square" rtlCol="0">
-                <a:spAutoFit/>
-              </a:bodyPr>
-              <a:lstStyle/>
-              <a:p>
-                <a:r>
-                  <a:rPr lang="en-US" sz="1100" dirty="0">
-                    <a:latin typeface="Arial" panose="020B0604020202020204" pitchFamily="34" charset="0"/>
-                    <a:cs typeface="Arial" panose="020B0604020202020204" pitchFamily="34" charset="0"/>
-                  </a:rPr>
-                  <a:t>1268</a:t>
-                </a:r>
-              </a:p>
-            </p:txBody>
-          </p:sp>
-        </p:grpSp>
+            <a:prstGeom prst="rect">
+              <a:avLst/>
+            </a:prstGeom>
+          </p:spPr>
+        </p:pic>
         <p:pic>
           <p:nvPicPr>
-            <p:cNvPr id="17" name="Picture 16" descr="A map of the united states&#10;&#10;Description automatically generated">
+            <p:cNvPr id="17" name="Picture 16">
               <a:extLst>
                 <a:ext uri="{FF2B5EF4-FFF2-40B4-BE49-F238E27FC236}">
                   <a16:creationId xmlns:a16="http://schemas.microsoft.com/office/drawing/2014/main" id="{71E5A4E4-C6D4-5E4E-90CF-DE325805C631}"/>
@@ -3468,14 +3413,13 @@
                 </a:ext>
               </a:extLst>
             </a:blip>
-            <a:stretch>
-              <a:fillRect/>
-            </a:stretch>
+            <a:srcRect/>
+            <a:stretch/>
           </p:blipFill>
           <p:spPr>
             <a:xfrm>
-              <a:off x="7323656" y="4054952"/>
-              <a:ext cx="2551864" cy="1766675"/>
+              <a:off x="2241639" y="3429000"/>
+              <a:ext cx="3340868" cy="2312909"/>
             </a:xfrm>
             <a:prstGeom prst="rect">
               <a:avLst/>
@@ -3510,8 +3454,8 @@
           </p:blipFill>
           <p:spPr>
             <a:xfrm>
-              <a:off x="9766163" y="5451232"/>
-              <a:ext cx="1751740" cy="1212743"/>
+              <a:off x="9264599" y="250740"/>
+              <a:ext cx="2455527" cy="1699980"/>
             </a:xfrm>
             <a:prstGeom prst="rect">
               <a:avLst/>
@@ -3520,10 +3464,10 @@
         </p:pic>
         <p:grpSp>
           <p:nvGrpSpPr>
-            <p:cNvPr id="49" name="Group 48">
+            <p:cNvPr id="2" name="Group 1">
               <a:extLst>
                 <a:ext uri="{FF2B5EF4-FFF2-40B4-BE49-F238E27FC236}">
-                  <a16:creationId xmlns:a16="http://schemas.microsoft.com/office/drawing/2014/main" id="{C4D32AFF-B106-F968-B739-7EED373E54BB}"/>
+                  <a16:creationId xmlns:a16="http://schemas.microsoft.com/office/drawing/2014/main" id="{561B026E-4055-9CA0-DA8F-4591D92E58AA}"/>
                 </a:ext>
               </a:extLst>
             </p:cNvPr>
@@ -3532,9 +3476,9 @@
           </p:nvGrpSpPr>
           <p:grpSpPr>
             <a:xfrm>
-              <a:off x="9445777" y="613934"/>
+              <a:off x="9341568" y="2261655"/>
               <a:ext cx="2378558" cy="2557891"/>
-              <a:chOff x="9445777" y="613934"/>
+              <a:chOff x="9047905" y="613933"/>
               <a:chExt cx="2378558" cy="2557891"/>
             </a:xfrm>
           </p:grpSpPr>
@@ -3552,7 +3496,7 @@
             </p:nvGrpSpPr>
             <p:grpSpPr>
               <a:xfrm>
-                <a:off x="9445777" y="613934"/>
+                <a:off x="9047905" y="613933"/>
                 <a:ext cx="2378558" cy="2557891"/>
                 <a:chOff x="9445777" y="613934"/>
                 <a:chExt cx="2378558" cy="2557891"/>
@@ -3618,7 +3562,7 @@
                 </a:prstGeom>
                 <a:ln w="19050">
                   <a:solidFill>
-                    <a:srgbClr val="0000FF"/>
+                    <a:srgbClr val="4785A7"/>
                   </a:solidFill>
                 </a:ln>
               </p:spPr>
@@ -3661,7 +3605,7 @@
                 </a:prstGeom>
                 <a:ln w="19050">
                   <a:solidFill>
-                    <a:srgbClr val="0000FF"/>
+                    <a:srgbClr val="4785A7"/>
                   </a:solidFill>
                 </a:ln>
               </p:spPr>
@@ -3704,7 +3648,7 @@
                 </a:prstGeom>
                 <a:ln w="19050">
                   <a:solidFill>
-                    <a:srgbClr val="0000FF"/>
+                    <a:srgbClr val="4785A7"/>
                   </a:solidFill>
                 </a:ln>
               </p:spPr>
@@ -3747,7 +3691,7 @@
                 </a:prstGeom>
                 <a:ln w="19050">
                   <a:solidFill>
-                    <a:srgbClr val="0000FF"/>
+                    <a:srgbClr val="4785A7"/>
                   </a:solidFill>
                 </a:ln>
               </p:spPr>
@@ -3783,7 +3727,7 @@
             </p:nvCxnSpPr>
             <p:spPr>
               <a:xfrm flipV="1">
-                <a:off x="9642595" y="1817701"/>
+                <a:off x="9244723" y="1817700"/>
                 <a:ext cx="123568" cy="67819"/>
               </a:xfrm>
               <a:prstGeom prst="line">
@@ -3791,7 +3735,7 @@
               </a:prstGeom>
               <a:ln w="19050">
                 <a:solidFill>
-                  <a:srgbClr val="008B00"/>
+                  <a:srgbClr val="65875A"/>
                 </a:solidFill>
               </a:ln>
             </p:spPr>
@@ -3826,7 +3770,7 @@
             </p:nvCxnSpPr>
             <p:spPr>
               <a:xfrm flipV="1">
-                <a:off x="9483917" y="1633586"/>
+                <a:off x="9086045" y="1633585"/>
                 <a:ext cx="123568" cy="67819"/>
               </a:xfrm>
               <a:prstGeom prst="line">
@@ -3834,7 +3778,7 @@
               </a:prstGeom>
               <a:ln w="19050">
                 <a:solidFill>
-                  <a:srgbClr val="008B00"/>
+                  <a:srgbClr val="65875A"/>
                 </a:solidFill>
               </a:ln>
             </p:spPr>
@@ -3869,7 +3813,7 @@
             </p:nvCxnSpPr>
             <p:spPr>
               <a:xfrm flipV="1">
-                <a:off x="9483917" y="1633586"/>
+                <a:off x="9086045" y="1633585"/>
                 <a:ext cx="282246" cy="141959"/>
               </a:xfrm>
               <a:prstGeom prst="line">
@@ -3877,7 +3821,7 @@
               </a:prstGeom>
               <a:ln w="19050">
                 <a:solidFill>
-                  <a:srgbClr val="008B00"/>
+                  <a:srgbClr val="65875A"/>
                 </a:solidFill>
               </a:ln>
             </p:spPr>
@@ -3912,7 +3856,7 @@
             </p:nvCxnSpPr>
             <p:spPr>
               <a:xfrm flipV="1">
-                <a:off x="9483917" y="1725644"/>
+                <a:off x="9086045" y="1725643"/>
                 <a:ext cx="282246" cy="141959"/>
               </a:xfrm>
               <a:prstGeom prst="line">
@@ -3920,7 +3864,7 @@
               </a:prstGeom>
               <a:ln w="19050">
                 <a:solidFill>
-                  <a:srgbClr val="008B00"/>
+                  <a:srgbClr val="65875A"/>
                 </a:solidFill>
               </a:ln>
             </p:spPr>

</xml_diff>

<commit_message>
updated barplot as discussed in 06/28 meeting
</commit_message>
<xml_diff>
--- a/Figures/Figure2/fig 2 formatting.pptx
+++ b/Figures/Figure2/fig 2 formatting.pptx
@@ -259,7 +259,7 @@
           <a:p>
             <a:fld id="{9C50F785-C80D-4A53-AFFE-8911002EEBDB}" type="datetimeFigureOut">
               <a:rPr lang="en-US" smtClean="0"/>
-              <a:t>3/7/2024</a:t>
+              <a:t>7/2/2024</a:t>
             </a:fld>
             <a:endParaRPr lang="en-US"/>
           </a:p>
@@ -457,7 +457,7 @@
           <a:p>
             <a:fld id="{9C50F785-C80D-4A53-AFFE-8911002EEBDB}" type="datetimeFigureOut">
               <a:rPr lang="en-US" smtClean="0"/>
-              <a:t>3/7/2024</a:t>
+              <a:t>7/2/2024</a:t>
             </a:fld>
             <a:endParaRPr lang="en-US"/>
           </a:p>
@@ -665,7 +665,7 @@
           <a:p>
             <a:fld id="{9C50F785-C80D-4A53-AFFE-8911002EEBDB}" type="datetimeFigureOut">
               <a:rPr lang="en-US" smtClean="0"/>
-              <a:t>3/7/2024</a:t>
+              <a:t>7/2/2024</a:t>
             </a:fld>
             <a:endParaRPr lang="en-US"/>
           </a:p>
@@ -863,7 +863,7 @@
           <a:p>
             <a:fld id="{9C50F785-C80D-4A53-AFFE-8911002EEBDB}" type="datetimeFigureOut">
               <a:rPr lang="en-US" smtClean="0"/>
-              <a:t>3/7/2024</a:t>
+              <a:t>7/2/2024</a:t>
             </a:fld>
             <a:endParaRPr lang="en-US"/>
           </a:p>
@@ -1138,7 +1138,7 @@
           <a:p>
             <a:fld id="{9C50F785-C80D-4A53-AFFE-8911002EEBDB}" type="datetimeFigureOut">
               <a:rPr lang="en-US" smtClean="0"/>
-              <a:t>3/7/2024</a:t>
+              <a:t>7/2/2024</a:t>
             </a:fld>
             <a:endParaRPr lang="en-US"/>
           </a:p>
@@ -1403,7 +1403,7 @@
           <a:p>
             <a:fld id="{9C50F785-C80D-4A53-AFFE-8911002EEBDB}" type="datetimeFigureOut">
               <a:rPr lang="en-US" smtClean="0"/>
-              <a:t>3/7/2024</a:t>
+              <a:t>7/2/2024</a:t>
             </a:fld>
             <a:endParaRPr lang="en-US"/>
           </a:p>
@@ -1815,7 +1815,7 @@
           <a:p>
             <a:fld id="{9C50F785-C80D-4A53-AFFE-8911002EEBDB}" type="datetimeFigureOut">
               <a:rPr lang="en-US" smtClean="0"/>
-              <a:t>3/7/2024</a:t>
+              <a:t>7/2/2024</a:t>
             </a:fld>
             <a:endParaRPr lang="en-US"/>
           </a:p>
@@ -1956,7 +1956,7 @@
           <a:p>
             <a:fld id="{9C50F785-C80D-4A53-AFFE-8911002EEBDB}" type="datetimeFigureOut">
               <a:rPr lang="en-US" smtClean="0"/>
-              <a:t>3/7/2024</a:t>
+              <a:t>7/2/2024</a:t>
             </a:fld>
             <a:endParaRPr lang="en-US"/>
           </a:p>
@@ -2069,7 +2069,7 @@
           <a:p>
             <a:fld id="{9C50F785-C80D-4A53-AFFE-8911002EEBDB}" type="datetimeFigureOut">
               <a:rPr lang="en-US" smtClean="0"/>
-              <a:t>3/7/2024</a:t>
+              <a:t>7/2/2024</a:t>
             </a:fld>
             <a:endParaRPr lang="en-US"/>
           </a:p>
@@ -2380,7 +2380,7 @@
           <a:p>
             <a:fld id="{9C50F785-C80D-4A53-AFFE-8911002EEBDB}" type="datetimeFigureOut">
               <a:rPr lang="en-US" smtClean="0"/>
-              <a:t>3/7/2024</a:t>
+              <a:t>7/2/2024</a:t>
             </a:fld>
             <a:endParaRPr lang="en-US"/>
           </a:p>
@@ -2668,7 +2668,7 @@
           <a:p>
             <a:fld id="{9C50F785-C80D-4A53-AFFE-8911002EEBDB}" type="datetimeFigureOut">
               <a:rPr lang="en-US" smtClean="0"/>
-              <a:t>3/7/2024</a:t>
+              <a:t>7/2/2024</a:t>
             </a:fld>
             <a:endParaRPr lang="en-US"/>
           </a:p>
@@ -2909,7 +2909,7 @@
           <a:p>
             <a:fld id="{9C50F785-C80D-4A53-AFFE-8911002EEBDB}" type="datetimeFigureOut">
               <a:rPr lang="en-US" smtClean="0"/>
-              <a:t>3/7/2024</a:t>
+              <a:t>7/2/2024</a:t>
             </a:fld>
             <a:endParaRPr lang="en-US"/>
           </a:p>
@@ -3341,9 +3341,9 @@
         <p:grpSpPr>
           <a:xfrm>
             <a:off x="-6103" y="-2701"/>
-            <a:ext cx="11726229" cy="7086605"/>
+            <a:ext cx="11726229" cy="7086604"/>
             <a:chOff x="-6103" y="-2701"/>
-            <a:chExt cx="11726229" cy="7086605"/>
+            <a:chExt cx="11726229" cy="7086604"/>
           </a:xfrm>
         </p:grpSpPr>
         <p:pic>
@@ -3384,7 +3384,7 @@
           <p:spPr>
             <a:xfrm>
               <a:off x="-6103" y="-2701"/>
-              <a:ext cx="9448808" cy="7086605"/>
+              <a:ext cx="9448807" cy="7086604"/>
             </a:xfrm>
             <a:prstGeom prst="rect">
               <a:avLst/>
@@ -3419,7 +3419,7 @@
           <p:spPr>
             <a:xfrm>
               <a:off x="2241639" y="3429000"/>
-              <a:ext cx="3340868" cy="2312909"/>
+              <a:ext cx="3340867" cy="2312908"/>
             </a:xfrm>
             <a:prstGeom prst="rect">
               <a:avLst/>
@@ -3476,10 +3476,10 @@
           </p:nvGrpSpPr>
           <p:grpSpPr>
             <a:xfrm>
-              <a:off x="9341568" y="2261655"/>
-              <a:ext cx="2378558" cy="2557891"/>
-              <a:chOff x="9047905" y="613933"/>
-              <a:chExt cx="2378558" cy="2557891"/>
+              <a:off x="9442704" y="2300239"/>
+              <a:ext cx="2184784" cy="2533476"/>
+              <a:chOff x="9149041" y="652517"/>
+              <a:chExt cx="2184784" cy="2533476"/>
             </a:xfrm>
           </p:grpSpPr>
           <p:grpSp>
@@ -3496,15 +3496,15 @@
             </p:nvGrpSpPr>
             <p:grpSpPr>
               <a:xfrm>
-                <a:off x="9047905" y="613933"/>
-                <a:ext cx="2378558" cy="2557891"/>
-                <a:chOff x="9445777" y="613934"/>
-                <a:chExt cx="2378558" cy="2557891"/>
+                <a:off x="9149041" y="652517"/>
+                <a:ext cx="2184784" cy="2533476"/>
+                <a:chOff x="9546913" y="652518"/>
+                <a:chExt cx="2184784" cy="2533476"/>
               </a:xfrm>
             </p:grpSpPr>
             <p:pic>
               <p:nvPicPr>
-                <p:cNvPr id="21" name="Picture 20" descr="A screen shot of a black background&#10;&#10;Description automatically generated">
+                <p:cNvPr id="21" name="Picture 20">
                   <a:extLst>
                     <a:ext uri="{FF2B5EF4-FFF2-40B4-BE49-F238E27FC236}">
                       <a16:creationId xmlns:a16="http://schemas.microsoft.com/office/drawing/2014/main" id="{70331926-F6B1-122F-0624-1A7DBAB3EE1F}"/>
@@ -3524,14 +3524,13 @@
                     </a:ext>
                   </a:extLst>
                 </a:blip>
-                <a:stretch>
-                  <a:fillRect/>
-                </a:stretch>
+                <a:srcRect/>
+                <a:stretch/>
               </p:blipFill>
               <p:spPr>
                 <a:xfrm>
-                  <a:off x="9445777" y="613934"/>
-                  <a:ext cx="2378558" cy="2557891"/>
+                  <a:off x="9546913" y="652518"/>
+                  <a:ext cx="2184784" cy="2533476"/>
                 </a:xfrm>
                 <a:prstGeom prst="rect">
                   <a:avLst/>
@@ -3554,13 +3553,13 @@
               </p:nvCxnSpPr>
               <p:spPr>
                 <a:xfrm flipV="1">
-                  <a:off x="9642595" y="2124622"/>
+                  <a:off x="9730180" y="2764700"/>
                   <a:ext cx="123568" cy="67819"/>
                 </a:xfrm>
                 <a:prstGeom prst="line">
                   <a:avLst/>
                 </a:prstGeom>
-                <a:ln w="19050">
+                <a:ln w="28575">
                   <a:solidFill>
                     <a:srgbClr val="4785A7"/>
                   </a:solidFill>
@@ -3597,13 +3596,13 @@
               </p:nvCxnSpPr>
               <p:spPr>
                 <a:xfrm flipV="1">
-                  <a:off x="9483917" y="1940507"/>
+                  <a:off x="9571502" y="2580585"/>
                   <a:ext cx="123568" cy="67819"/>
                 </a:xfrm>
                 <a:prstGeom prst="line">
                   <a:avLst/>
                 </a:prstGeom>
-                <a:ln w="19050">
+                <a:ln w="28575">
                   <a:solidFill>
                     <a:srgbClr val="4785A7"/>
                   </a:solidFill>
@@ -3640,13 +3639,13 @@
               </p:nvCxnSpPr>
               <p:spPr>
                 <a:xfrm flipV="1">
-                  <a:off x="9483917" y="1940507"/>
+                  <a:off x="9571502" y="2580585"/>
                   <a:ext cx="282246" cy="141959"/>
                 </a:xfrm>
                 <a:prstGeom prst="line">
                   <a:avLst/>
                 </a:prstGeom>
-                <a:ln w="19050">
+                <a:ln w="28575">
                   <a:solidFill>
                     <a:srgbClr val="4785A7"/>
                   </a:solidFill>
@@ -3683,13 +3682,13 @@
               </p:nvCxnSpPr>
               <p:spPr>
                 <a:xfrm flipV="1">
-                  <a:off x="9483917" y="2032565"/>
+                  <a:off x="9571502" y="2672643"/>
                   <a:ext cx="282246" cy="141959"/>
                 </a:xfrm>
                 <a:prstGeom prst="line">
                   <a:avLst/>
                 </a:prstGeom>
-                <a:ln w="19050">
+                <a:ln w="28575">
                   <a:solidFill>
                     <a:srgbClr val="4785A7"/>
                   </a:solidFill>
@@ -3727,13 +3726,13 @@
             </p:nvCxnSpPr>
             <p:spPr>
               <a:xfrm flipV="1">
-                <a:off x="9244723" y="1817700"/>
+                <a:off x="9349863" y="1265411"/>
                 <a:ext cx="123568" cy="67819"/>
               </a:xfrm>
               <a:prstGeom prst="line">
                 <a:avLst/>
               </a:prstGeom>
-              <a:ln w="19050">
+              <a:ln w="28575">
                 <a:solidFill>
                   <a:srgbClr val="65875A"/>
                 </a:solidFill>
@@ -3770,13 +3769,13 @@
             </p:nvCxnSpPr>
             <p:spPr>
               <a:xfrm flipV="1">
-                <a:off x="9086045" y="1633585"/>
+                <a:off x="9191185" y="1081296"/>
                 <a:ext cx="123568" cy="67819"/>
               </a:xfrm>
               <a:prstGeom prst="line">
                 <a:avLst/>
               </a:prstGeom>
-              <a:ln w="19050">
+              <a:ln w="28575">
                 <a:solidFill>
                   <a:srgbClr val="65875A"/>
                 </a:solidFill>
@@ -3813,13 +3812,13 @@
             </p:nvCxnSpPr>
             <p:spPr>
               <a:xfrm flipV="1">
-                <a:off x="9086045" y="1633585"/>
+                <a:off x="9191185" y="1081296"/>
                 <a:ext cx="282246" cy="141959"/>
               </a:xfrm>
               <a:prstGeom prst="line">
                 <a:avLst/>
               </a:prstGeom>
-              <a:ln w="19050">
+              <a:ln w="28575">
                 <a:solidFill>
                   <a:srgbClr val="65875A"/>
                 </a:solidFill>
@@ -3856,13 +3855,13 @@
             </p:nvCxnSpPr>
             <p:spPr>
               <a:xfrm flipV="1">
-                <a:off x="9086045" y="1725643"/>
+                <a:off x="9191185" y="1173354"/>
                 <a:ext cx="282246" cy="141959"/>
               </a:xfrm>
               <a:prstGeom prst="line">
                 <a:avLst/>
               </a:prstGeom>
-              <a:ln w="19050">
+              <a:ln w="28575">
                 <a:solidFill>
                   <a:srgbClr val="65875A"/>
                 </a:solidFill>

</xml_diff>

<commit_message>
updated fig 2 with new data
</commit_message>
<xml_diff>
--- a/Figures/Figure2/fig 2 formatting.pptx
+++ b/Figures/Figure2/fig 2 formatting.pptx
@@ -259,7 +259,7 @@
           <a:p>
             <a:fld id="{9C50F785-C80D-4A53-AFFE-8911002EEBDB}" type="datetimeFigureOut">
               <a:rPr lang="en-US" smtClean="0"/>
-              <a:t>7/2/2024</a:t>
+              <a:t>8/8/2024</a:t>
             </a:fld>
             <a:endParaRPr lang="en-US"/>
           </a:p>
@@ -457,7 +457,7 @@
           <a:p>
             <a:fld id="{9C50F785-C80D-4A53-AFFE-8911002EEBDB}" type="datetimeFigureOut">
               <a:rPr lang="en-US" smtClean="0"/>
-              <a:t>7/2/2024</a:t>
+              <a:t>8/8/2024</a:t>
             </a:fld>
             <a:endParaRPr lang="en-US"/>
           </a:p>
@@ -665,7 +665,7 @@
           <a:p>
             <a:fld id="{9C50F785-C80D-4A53-AFFE-8911002EEBDB}" type="datetimeFigureOut">
               <a:rPr lang="en-US" smtClean="0"/>
-              <a:t>7/2/2024</a:t>
+              <a:t>8/8/2024</a:t>
             </a:fld>
             <a:endParaRPr lang="en-US"/>
           </a:p>
@@ -863,7 +863,7 @@
           <a:p>
             <a:fld id="{9C50F785-C80D-4A53-AFFE-8911002EEBDB}" type="datetimeFigureOut">
               <a:rPr lang="en-US" smtClean="0"/>
-              <a:t>7/2/2024</a:t>
+              <a:t>8/8/2024</a:t>
             </a:fld>
             <a:endParaRPr lang="en-US"/>
           </a:p>
@@ -1138,7 +1138,7 @@
           <a:p>
             <a:fld id="{9C50F785-C80D-4A53-AFFE-8911002EEBDB}" type="datetimeFigureOut">
               <a:rPr lang="en-US" smtClean="0"/>
-              <a:t>7/2/2024</a:t>
+              <a:t>8/8/2024</a:t>
             </a:fld>
             <a:endParaRPr lang="en-US"/>
           </a:p>
@@ -1403,7 +1403,7 @@
           <a:p>
             <a:fld id="{9C50F785-C80D-4A53-AFFE-8911002EEBDB}" type="datetimeFigureOut">
               <a:rPr lang="en-US" smtClean="0"/>
-              <a:t>7/2/2024</a:t>
+              <a:t>8/8/2024</a:t>
             </a:fld>
             <a:endParaRPr lang="en-US"/>
           </a:p>
@@ -1815,7 +1815,7 @@
           <a:p>
             <a:fld id="{9C50F785-C80D-4A53-AFFE-8911002EEBDB}" type="datetimeFigureOut">
               <a:rPr lang="en-US" smtClean="0"/>
-              <a:t>7/2/2024</a:t>
+              <a:t>8/8/2024</a:t>
             </a:fld>
             <a:endParaRPr lang="en-US"/>
           </a:p>
@@ -1956,7 +1956,7 @@
           <a:p>
             <a:fld id="{9C50F785-C80D-4A53-AFFE-8911002EEBDB}" type="datetimeFigureOut">
               <a:rPr lang="en-US" smtClean="0"/>
-              <a:t>7/2/2024</a:t>
+              <a:t>8/8/2024</a:t>
             </a:fld>
             <a:endParaRPr lang="en-US"/>
           </a:p>
@@ -2069,7 +2069,7 @@
           <a:p>
             <a:fld id="{9C50F785-C80D-4A53-AFFE-8911002EEBDB}" type="datetimeFigureOut">
               <a:rPr lang="en-US" smtClean="0"/>
-              <a:t>7/2/2024</a:t>
+              <a:t>8/8/2024</a:t>
             </a:fld>
             <a:endParaRPr lang="en-US"/>
           </a:p>
@@ -2380,7 +2380,7 @@
           <a:p>
             <a:fld id="{9C50F785-C80D-4A53-AFFE-8911002EEBDB}" type="datetimeFigureOut">
               <a:rPr lang="en-US" smtClean="0"/>
-              <a:t>7/2/2024</a:t>
+              <a:t>8/8/2024</a:t>
             </a:fld>
             <a:endParaRPr lang="en-US"/>
           </a:p>
@@ -2668,7 +2668,7 @@
           <a:p>
             <a:fld id="{9C50F785-C80D-4A53-AFFE-8911002EEBDB}" type="datetimeFigureOut">
               <a:rPr lang="en-US" smtClean="0"/>
-              <a:t>7/2/2024</a:t>
+              <a:t>8/8/2024</a:t>
             </a:fld>
             <a:endParaRPr lang="en-US"/>
           </a:p>
@@ -2909,7 +2909,7 @@
           <a:p>
             <a:fld id="{9C50F785-C80D-4A53-AFFE-8911002EEBDB}" type="datetimeFigureOut">
               <a:rPr lang="en-US" smtClean="0"/>
-              <a:t>7/2/2024</a:t>
+              <a:t>8/8/2024</a:t>
             </a:fld>
             <a:endParaRPr lang="en-US"/>
           </a:p>
@@ -3328,10 +3328,10 @@
       </p:grpSpPr>
       <p:grpSp>
         <p:nvGrpSpPr>
-          <p:cNvPr id="22" name="Group 21">
-            <a:extLst>
-              <a:ext uri="{FF2B5EF4-FFF2-40B4-BE49-F238E27FC236}">
-                <a16:creationId xmlns:a16="http://schemas.microsoft.com/office/drawing/2014/main" id="{DEC5A411-CA96-6F25-BB2D-846009BD4421}"/>
+          <p:cNvPr id="13" name="Group 12">
+            <a:extLst>
+              <a:ext uri="{FF2B5EF4-FFF2-40B4-BE49-F238E27FC236}">
+                <a16:creationId xmlns:a16="http://schemas.microsoft.com/office/drawing/2014/main" id="{1ECF2438-C19D-E2C9-86A0-F124BB4A6205}"/>
               </a:ext>
             </a:extLst>
           </p:cNvPr>
@@ -3340,18 +3340,18 @@
         </p:nvGrpSpPr>
         <p:grpSpPr>
           <a:xfrm>
-            <a:off x="-6103" y="-2701"/>
-            <a:ext cx="11726229" cy="7086604"/>
-            <a:chOff x="-6103" y="-2701"/>
-            <a:chExt cx="11726229" cy="7086604"/>
+            <a:off x="-6102" y="-2701"/>
+            <a:ext cx="11726228" cy="7086604"/>
+            <a:chOff x="-6102" y="-2701"/>
+            <a:chExt cx="11726228" cy="7086604"/>
           </a:xfrm>
         </p:grpSpPr>
         <p:pic>
           <p:nvPicPr>
-            <p:cNvPr id="14" name="Picture 13">
+            <p:cNvPr id="12" name="Picture 11" descr="A screen shot of a graph&#10;&#10;Description automatically generated">
               <a:extLst>
                 <a:ext uri="{FF2B5EF4-FFF2-40B4-BE49-F238E27FC236}">
-                  <a16:creationId xmlns:a16="http://schemas.microsoft.com/office/drawing/2014/main" id="{2B7BA915-479E-9963-414F-9CB3C29133DC}"/>
+                  <a16:creationId xmlns:a16="http://schemas.microsoft.com/office/drawing/2014/main" id="{9BA28E38-0CD4-0FF5-20E7-541F4C7BFEB0}"/>
                 </a:ext>
               </a:extLst>
             </p:cNvPr>
@@ -3360,102 +3360,21 @@
             </p:cNvPicPr>
             <p:nvPr/>
           </p:nvPicPr>
-          <p:blipFill>
+          <p:blipFill rotWithShape="1">
             <a:blip r:embed="rId2">
-              <a:clrChange>
-                <a:clrFrom>
-                  <a:srgbClr val="FFFFFF"/>
-                </a:clrFrom>
-                <a:clrTo>
-                  <a:srgbClr val="FFFFFF">
-                    <a:alpha val="0"/>
-                  </a:srgbClr>
-                </a:clrTo>
-              </a:clrChange>
               <a:extLst>
                 <a:ext uri="{28A0092B-C50C-407E-A947-70E740481C1C}">
                   <a14:useLocalDpi xmlns:a14="http://schemas.microsoft.com/office/drawing/2010/main" val="0"/>
                 </a:ext>
               </a:extLst>
             </a:blip>
-            <a:srcRect/>
+            <a:srcRect l="71538" t="25361" r="1941" b="29771"/>
             <a:stretch/>
           </p:blipFill>
           <p:spPr>
             <a:xfrm>
-              <a:off x="-6103" y="-2701"/>
-              <a:ext cx="9448807" cy="7086604"/>
-            </a:xfrm>
-            <a:prstGeom prst="rect">
-              <a:avLst/>
-            </a:prstGeom>
-          </p:spPr>
-        </p:pic>
-        <p:pic>
-          <p:nvPicPr>
-            <p:cNvPr id="17" name="Picture 16">
-              <a:extLst>
-                <a:ext uri="{FF2B5EF4-FFF2-40B4-BE49-F238E27FC236}">
-                  <a16:creationId xmlns:a16="http://schemas.microsoft.com/office/drawing/2014/main" id="{71E5A4E4-C6D4-5E4E-90CF-DE325805C631}"/>
-                </a:ext>
-              </a:extLst>
-            </p:cNvPr>
-            <p:cNvPicPr>
-              <a:picLocks noChangeAspect="1"/>
-            </p:cNvPicPr>
-            <p:nvPr/>
-          </p:nvPicPr>
-          <p:blipFill>
-            <a:blip r:embed="rId3">
-              <a:extLst>
-                <a:ext uri="{28A0092B-C50C-407E-A947-70E740481C1C}">
-                  <a14:useLocalDpi xmlns:a14="http://schemas.microsoft.com/office/drawing/2010/main" val="0"/>
-                </a:ext>
-              </a:extLst>
-            </a:blip>
-            <a:srcRect/>
-            <a:stretch/>
-          </p:blipFill>
-          <p:spPr>
-            <a:xfrm>
-              <a:off x="2241639" y="3429000"/>
-              <a:ext cx="3340867" cy="2312908"/>
-            </a:xfrm>
-            <a:prstGeom prst="rect">
-              <a:avLst/>
-            </a:prstGeom>
-          </p:spPr>
-        </p:pic>
-        <p:pic>
-          <p:nvPicPr>
-            <p:cNvPr id="19" name="Picture 18" descr="A map of the united states&#10;&#10;Description automatically generated">
-              <a:extLst>
-                <a:ext uri="{FF2B5EF4-FFF2-40B4-BE49-F238E27FC236}">
-                  <a16:creationId xmlns:a16="http://schemas.microsoft.com/office/drawing/2014/main" id="{F023684B-DF1A-AD87-52CC-A351C1E74828}"/>
-                </a:ext>
-              </a:extLst>
-            </p:cNvPr>
-            <p:cNvPicPr>
-              <a:picLocks noChangeAspect="1"/>
-            </p:cNvPicPr>
-            <p:nvPr/>
-          </p:nvPicPr>
-          <p:blipFill>
-            <a:blip r:embed="rId4">
-              <a:extLst>
-                <a:ext uri="{28A0092B-C50C-407E-A947-70E740481C1C}">
-                  <a14:useLocalDpi xmlns:a14="http://schemas.microsoft.com/office/drawing/2010/main" val="0"/>
-                </a:ext>
-              </a:extLst>
-            </a:blip>
-            <a:stretch>
-              <a:fillRect/>
-            </a:stretch>
-          </p:blipFill>
-          <p:spPr>
-            <a:xfrm>
-              <a:off x="9264599" y="250740"/>
-              <a:ext cx="2455527" cy="1699980"/>
+              <a:off x="9442703" y="2281554"/>
+              <a:ext cx="2155233" cy="2524362"/>
             </a:xfrm>
             <a:prstGeom prst="rect">
               <a:avLst/>
@@ -3464,10 +3383,10 @@
         </p:pic>
         <p:grpSp>
           <p:nvGrpSpPr>
-            <p:cNvPr id="2" name="Group 1">
+            <p:cNvPr id="10" name="Group 9">
               <a:extLst>
                 <a:ext uri="{FF2B5EF4-FFF2-40B4-BE49-F238E27FC236}">
-                  <a16:creationId xmlns:a16="http://schemas.microsoft.com/office/drawing/2014/main" id="{561B026E-4055-9CA0-DA8F-4591D92E58AA}"/>
+                  <a16:creationId xmlns:a16="http://schemas.microsoft.com/office/drawing/2014/main" id="{F519A32A-C34F-80F8-278B-859351832E47}"/>
                 </a:ext>
               </a:extLst>
             </p:cNvPr>
@@ -3476,18 +3395,18 @@
           </p:nvGrpSpPr>
           <p:grpSpPr>
             <a:xfrm>
-              <a:off x="9442704" y="2300239"/>
-              <a:ext cx="2184784" cy="2533476"/>
-              <a:chOff x="9149041" y="652517"/>
-              <a:chExt cx="2184784" cy="2533476"/>
+              <a:off x="-6102" y="-2701"/>
+              <a:ext cx="11726228" cy="7086604"/>
+              <a:chOff x="-6102" y="-2701"/>
+              <a:chExt cx="11726228" cy="7086604"/>
             </a:xfrm>
           </p:grpSpPr>
           <p:grpSp>
             <p:nvGrpSpPr>
-              <p:cNvPr id="44" name="Group 43">
+              <p:cNvPr id="7" name="Group 6">
                 <a:extLst>
                   <a:ext uri="{FF2B5EF4-FFF2-40B4-BE49-F238E27FC236}">
-                    <a16:creationId xmlns:a16="http://schemas.microsoft.com/office/drawing/2014/main" id="{9D35DB5D-26BA-BBA1-A48F-477D6E301A4F}"/>
+                    <a16:creationId xmlns:a16="http://schemas.microsoft.com/office/drawing/2014/main" id="{6CBAAC72-12A4-6563-E2DA-975D948F51C8}"/>
                   </a:ext>
                 </a:extLst>
               </p:cNvPr>
@@ -3496,18 +3415,155 @@
             </p:nvGrpSpPr>
             <p:grpSpPr>
               <a:xfrm>
-                <a:off x="9149041" y="652517"/>
-                <a:ext cx="2184784" cy="2533476"/>
-                <a:chOff x="9546913" y="652518"/>
-                <a:chExt cx="2184784" cy="2533476"/>
+                <a:off x="-6102" y="-2701"/>
+                <a:ext cx="11726228" cy="7086604"/>
+                <a:chOff x="-6102" y="-2701"/>
+                <a:chExt cx="11726228" cy="7086604"/>
               </a:xfrm>
             </p:grpSpPr>
+            <p:grpSp>
+              <p:nvGrpSpPr>
+                <p:cNvPr id="22" name="Group 21">
+                  <a:extLst>
+                    <a:ext uri="{FF2B5EF4-FFF2-40B4-BE49-F238E27FC236}">
+                      <a16:creationId xmlns:a16="http://schemas.microsoft.com/office/drawing/2014/main" id="{DEC5A411-CA96-6F25-BB2D-846009BD4421}"/>
+                    </a:ext>
+                  </a:extLst>
+                </p:cNvPr>
+                <p:cNvGrpSpPr/>
+                <p:nvPr/>
+              </p:nvGrpSpPr>
+              <p:grpSpPr>
+                <a:xfrm>
+                  <a:off x="-6102" y="-2701"/>
+                  <a:ext cx="11726228" cy="7086604"/>
+                  <a:chOff x="-6102" y="-2701"/>
+                  <a:chExt cx="11726228" cy="7086604"/>
+                </a:xfrm>
+              </p:grpSpPr>
+              <p:pic>
+                <p:nvPicPr>
+                  <p:cNvPr id="14" name="Picture 13">
+                    <a:extLst>
+                      <a:ext uri="{FF2B5EF4-FFF2-40B4-BE49-F238E27FC236}">
+                        <a16:creationId xmlns:a16="http://schemas.microsoft.com/office/drawing/2014/main" id="{2B7BA915-479E-9963-414F-9CB3C29133DC}"/>
+                      </a:ext>
+                    </a:extLst>
+                  </p:cNvPr>
+                  <p:cNvPicPr>
+                    <a:picLocks noChangeAspect="1"/>
+                  </p:cNvPicPr>
+                  <p:nvPr/>
+                </p:nvPicPr>
+                <p:blipFill>
+                  <a:blip r:embed="rId3">
+                    <a:clrChange>
+                      <a:clrFrom>
+                        <a:srgbClr val="FFFFFF"/>
+                      </a:clrFrom>
+                      <a:clrTo>
+                        <a:srgbClr val="FFFFFF">
+                          <a:alpha val="0"/>
+                        </a:srgbClr>
+                      </a:clrTo>
+                    </a:clrChange>
+                    <a:extLst>
+                      <a:ext uri="{28A0092B-C50C-407E-A947-70E740481C1C}">
+                        <a14:useLocalDpi xmlns:a14="http://schemas.microsoft.com/office/drawing/2010/main" val="0"/>
+                      </a:ext>
+                    </a:extLst>
+                  </a:blip>
+                  <a:srcRect/>
+                  <a:stretch/>
+                </p:blipFill>
+                <p:spPr>
+                  <a:xfrm>
+                    <a:off x="-6102" y="-2701"/>
+                    <a:ext cx="9448805" cy="7086604"/>
+                  </a:xfrm>
+                  <a:prstGeom prst="rect">
+                    <a:avLst/>
+                  </a:prstGeom>
+                </p:spPr>
+              </p:pic>
+              <p:pic>
+                <p:nvPicPr>
+                  <p:cNvPr id="17" name="Picture 16">
+                    <a:extLst>
+                      <a:ext uri="{FF2B5EF4-FFF2-40B4-BE49-F238E27FC236}">
+                        <a16:creationId xmlns:a16="http://schemas.microsoft.com/office/drawing/2014/main" id="{71E5A4E4-C6D4-5E4E-90CF-DE325805C631}"/>
+                      </a:ext>
+                    </a:extLst>
+                  </p:cNvPr>
+                  <p:cNvPicPr>
+                    <a:picLocks noChangeAspect="1"/>
+                  </p:cNvPicPr>
+                  <p:nvPr/>
+                </p:nvPicPr>
+                <p:blipFill>
+                  <a:blip r:embed="rId4">
+                    <a:extLst>
+                      <a:ext uri="{28A0092B-C50C-407E-A947-70E740481C1C}">
+                        <a14:useLocalDpi xmlns:a14="http://schemas.microsoft.com/office/drawing/2010/main" val="0"/>
+                      </a:ext>
+                    </a:extLst>
+                  </a:blip>
+                  <a:srcRect/>
+                  <a:stretch/>
+                </p:blipFill>
+                <p:spPr>
+                  <a:xfrm>
+                    <a:off x="2241639" y="3429000"/>
+                    <a:ext cx="3340867" cy="2312907"/>
+                  </a:xfrm>
+                  <a:prstGeom prst="rect">
+                    <a:avLst/>
+                  </a:prstGeom>
+                </p:spPr>
+              </p:pic>
+              <p:pic>
+                <p:nvPicPr>
+                  <p:cNvPr id="19" name="Picture 18" descr="A map of the united states&#10;&#10;Description automatically generated">
+                    <a:extLst>
+                      <a:ext uri="{FF2B5EF4-FFF2-40B4-BE49-F238E27FC236}">
+                        <a16:creationId xmlns:a16="http://schemas.microsoft.com/office/drawing/2014/main" id="{F023684B-DF1A-AD87-52CC-A351C1E74828}"/>
+                      </a:ext>
+                    </a:extLst>
+                  </p:cNvPr>
+                  <p:cNvPicPr>
+                    <a:picLocks noChangeAspect="1"/>
+                  </p:cNvPicPr>
+                  <p:nvPr/>
+                </p:nvPicPr>
+                <p:blipFill>
+                  <a:blip r:embed="rId5">
+                    <a:extLst>
+                      <a:ext uri="{28A0092B-C50C-407E-A947-70E740481C1C}">
+                        <a14:useLocalDpi xmlns:a14="http://schemas.microsoft.com/office/drawing/2010/main" val="0"/>
+                      </a:ext>
+                    </a:extLst>
+                  </a:blip>
+                  <a:stretch>
+                    <a:fillRect/>
+                  </a:stretch>
+                </p:blipFill>
+                <p:spPr>
+                  <a:xfrm>
+                    <a:off x="9264599" y="250740"/>
+                    <a:ext cx="2455527" cy="1699980"/>
+                  </a:xfrm>
+                  <a:prstGeom prst="rect">
+                    <a:avLst/>
+                  </a:prstGeom>
+                </p:spPr>
+              </p:pic>
+            </p:grpSp>
             <p:pic>
               <p:nvPicPr>
-                <p:cNvPr id="21" name="Picture 20">
+                <p:cNvPr id="6" name="Picture 5">
                   <a:extLst>
                     <a:ext uri="{FF2B5EF4-FFF2-40B4-BE49-F238E27FC236}">
-                      <a16:creationId xmlns:a16="http://schemas.microsoft.com/office/drawing/2014/main" id="{70331926-F6B1-122F-0624-1A7DBAB3EE1F}"/>
+                      <a16:creationId xmlns:a16="http://schemas.microsoft.com/office/drawing/2014/main" id="{9F1F884E-E8EE-DB6B-0D3A-76546F5D632F}"/>
                     </a:ext>
                   </a:extLst>
                 </p:cNvPr>
@@ -3517,371 +3573,52 @@
                 <p:nvPr/>
               </p:nvPicPr>
               <p:blipFill>
-                <a:blip r:embed="rId5">
-                  <a:extLst>
-                    <a:ext uri="{28A0092B-C50C-407E-A947-70E740481C1C}">
-                      <a14:useLocalDpi xmlns:a14="http://schemas.microsoft.com/office/drawing/2010/main" val="0"/>
-                    </a:ext>
-                  </a:extLst>
-                </a:blip>
-                <a:srcRect/>
-                <a:stretch/>
+                <a:blip r:embed="rId6"/>
+                <a:stretch>
+                  <a:fillRect/>
+                </a:stretch>
               </p:blipFill>
               <p:spPr>
                 <a:xfrm>
-                  <a:off x="9546913" y="652518"/>
-                  <a:ext cx="2184784" cy="2533476"/>
+                  <a:off x="9513633" y="2715351"/>
+                  <a:ext cx="267401" cy="251357"/>
                 </a:xfrm>
                 <a:prstGeom prst="rect">
                   <a:avLst/>
                 </a:prstGeom>
               </p:spPr>
             </p:pic>
-            <p:cxnSp>
-              <p:nvCxnSpPr>
-                <p:cNvPr id="36" name="Straight Connector 35">
-                  <a:extLst>
-                    <a:ext uri="{FF2B5EF4-FFF2-40B4-BE49-F238E27FC236}">
-                      <a16:creationId xmlns:a16="http://schemas.microsoft.com/office/drawing/2014/main" id="{F58A67D5-A0ED-9B7F-287F-ABDF102E7AAF}"/>
-                    </a:ext>
-                  </a:extLst>
-                </p:cNvPr>
-                <p:cNvCxnSpPr>
-                  <a:cxnSpLocks/>
-                </p:cNvCxnSpPr>
-                <p:nvPr/>
-              </p:nvCxnSpPr>
-              <p:spPr>
-                <a:xfrm flipV="1">
-                  <a:off x="9730180" y="2764700"/>
-                  <a:ext cx="123568" cy="67819"/>
-                </a:xfrm>
-                <a:prstGeom prst="line">
-                  <a:avLst/>
-                </a:prstGeom>
-                <a:ln w="28575">
-                  <a:solidFill>
-                    <a:srgbClr val="4785A7"/>
-                  </a:solidFill>
-                </a:ln>
-              </p:spPr>
-              <p:style>
-                <a:lnRef idx="1">
-                  <a:schemeClr val="accent1"/>
-                </a:lnRef>
-                <a:fillRef idx="0">
-                  <a:schemeClr val="accent1"/>
-                </a:fillRef>
-                <a:effectRef idx="0">
-                  <a:schemeClr val="accent1"/>
-                </a:effectRef>
-                <a:fontRef idx="minor">
-                  <a:schemeClr val="tx1"/>
-                </a:fontRef>
-              </p:style>
-            </p:cxnSp>
-            <p:cxnSp>
-              <p:nvCxnSpPr>
-                <p:cNvPr id="40" name="Straight Connector 39">
-                  <a:extLst>
-                    <a:ext uri="{FF2B5EF4-FFF2-40B4-BE49-F238E27FC236}">
-                      <a16:creationId xmlns:a16="http://schemas.microsoft.com/office/drawing/2014/main" id="{448F29B9-BCAB-CB89-ABB9-C33C7C3EDCD5}"/>
-                    </a:ext>
-                  </a:extLst>
-                </p:cNvPr>
-                <p:cNvCxnSpPr>
-                  <a:cxnSpLocks/>
-                </p:cNvCxnSpPr>
-                <p:nvPr/>
-              </p:nvCxnSpPr>
-              <p:spPr>
-                <a:xfrm flipV="1">
-                  <a:off x="9571502" y="2580585"/>
-                  <a:ext cx="123568" cy="67819"/>
-                </a:xfrm>
-                <a:prstGeom prst="line">
-                  <a:avLst/>
-                </a:prstGeom>
-                <a:ln w="28575">
-                  <a:solidFill>
-                    <a:srgbClr val="4785A7"/>
-                  </a:solidFill>
-                </a:ln>
-              </p:spPr>
-              <p:style>
-                <a:lnRef idx="1">
-                  <a:schemeClr val="accent1"/>
-                </a:lnRef>
-                <a:fillRef idx="0">
-                  <a:schemeClr val="accent1"/>
-                </a:fillRef>
-                <a:effectRef idx="0">
-                  <a:schemeClr val="accent1"/>
-                </a:effectRef>
-                <a:fontRef idx="minor">
-                  <a:schemeClr val="tx1"/>
-                </a:fontRef>
-              </p:style>
-            </p:cxnSp>
-            <p:cxnSp>
-              <p:nvCxnSpPr>
-                <p:cNvPr id="41" name="Straight Connector 40">
-                  <a:extLst>
-                    <a:ext uri="{FF2B5EF4-FFF2-40B4-BE49-F238E27FC236}">
-                      <a16:creationId xmlns:a16="http://schemas.microsoft.com/office/drawing/2014/main" id="{503FFE07-0123-D66E-0624-235BB6FFB2AD}"/>
-                    </a:ext>
-                  </a:extLst>
-                </p:cNvPr>
-                <p:cNvCxnSpPr>
-                  <a:cxnSpLocks/>
-                </p:cNvCxnSpPr>
-                <p:nvPr/>
-              </p:nvCxnSpPr>
-              <p:spPr>
-                <a:xfrm flipV="1">
-                  <a:off x="9571502" y="2580585"/>
-                  <a:ext cx="282246" cy="141959"/>
-                </a:xfrm>
-                <a:prstGeom prst="line">
-                  <a:avLst/>
-                </a:prstGeom>
-                <a:ln w="28575">
-                  <a:solidFill>
-                    <a:srgbClr val="4785A7"/>
-                  </a:solidFill>
-                </a:ln>
-              </p:spPr>
-              <p:style>
-                <a:lnRef idx="1">
-                  <a:schemeClr val="accent1"/>
-                </a:lnRef>
-                <a:fillRef idx="0">
-                  <a:schemeClr val="accent1"/>
-                </a:fillRef>
-                <a:effectRef idx="0">
-                  <a:schemeClr val="accent1"/>
-                </a:effectRef>
-                <a:fontRef idx="minor">
-                  <a:schemeClr val="tx1"/>
-                </a:fontRef>
-              </p:style>
-            </p:cxnSp>
-            <p:cxnSp>
-              <p:nvCxnSpPr>
-                <p:cNvPr id="43" name="Straight Connector 42">
-                  <a:extLst>
-                    <a:ext uri="{FF2B5EF4-FFF2-40B4-BE49-F238E27FC236}">
-                      <a16:creationId xmlns:a16="http://schemas.microsoft.com/office/drawing/2014/main" id="{7215204D-C4EA-4088-397A-27468242594C}"/>
-                    </a:ext>
-                  </a:extLst>
-                </p:cNvPr>
-                <p:cNvCxnSpPr>
-                  <a:cxnSpLocks/>
-                </p:cNvCxnSpPr>
-                <p:nvPr/>
-              </p:nvCxnSpPr>
-              <p:spPr>
-                <a:xfrm flipV="1">
-                  <a:off x="9571502" y="2672643"/>
-                  <a:ext cx="282246" cy="141959"/>
-                </a:xfrm>
-                <a:prstGeom prst="line">
-                  <a:avLst/>
-                </a:prstGeom>
-                <a:ln w="28575">
-                  <a:solidFill>
-                    <a:srgbClr val="4785A7"/>
-                  </a:solidFill>
-                </a:ln>
-              </p:spPr>
-              <p:style>
-                <a:lnRef idx="1">
-                  <a:schemeClr val="accent1"/>
-                </a:lnRef>
-                <a:fillRef idx="0">
-                  <a:schemeClr val="accent1"/>
-                </a:fillRef>
-                <a:effectRef idx="0">
-                  <a:schemeClr val="accent1"/>
-                </a:effectRef>
-                <a:fontRef idx="minor">
-                  <a:schemeClr val="tx1"/>
-                </a:fontRef>
-              </p:style>
-            </p:cxnSp>
           </p:grpSp>
-          <p:cxnSp>
-            <p:nvCxnSpPr>
-              <p:cNvPr id="45" name="Straight Connector 44">
+          <p:pic>
+            <p:nvPicPr>
+              <p:cNvPr id="9" name="Picture 8">
                 <a:extLst>
                   <a:ext uri="{FF2B5EF4-FFF2-40B4-BE49-F238E27FC236}">
-                    <a16:creationId xmlns:a16="http://schemas.microsoft.com/office/drawing/2014/main" id="{4EB54346-3632-ED35-FC38-A30607C3B77A}"/>
+                    <a16:creationId xmlns:a16="http://schemas.microsoft.com/office/drawing/2014/main" id="{E90E2E7B-7359-6B24-76E6-23C745F409F0}"/>
                   </a:ext>
                 </a:extLst>
               </p:cNvPr>
-              <p:cNvCxnSpPr>
-                <a:cxnSpLocks/>
-              </p:cNvCxnSpPr>
+              <p:cNvPicPr>
+                <a:picLocks noChangeAspect="1"/>
+              </p:cNvPicPr>
               <p:nvPr/>
-            </p:nvCxnSpPr>
+            </p:nvPicPr>
+            <p:blipFill>
+              <a:blip r:embed="rId7"/>
+              <a:stretch>
+                <a:fillRect/>
+              </a:stretch>
+            </p:blipFill>
             <p:spPr>
-              <a:xfrm flipV="1">
-                <a:off x="9349863" y="1265411"/>
-                <a:ext cx="123568" cy="67819"/>
+              <a:xfrm>
+                <a:off x="9513633" y="4200374"/>
+                <a:ext cx="267401" cy="249575"/>
               </a:xfrm>
-              <a:prstGeom prst="line">
+              <a:prstGeom prst="rect">
                 <a:avLst/>
               </a:prstGeom>
-              <a:ln w="28575">
-                <a:solidFill>
-                  <a:srgbClr val="65875A"/>
-                </a:solidFill>
-              </a:ln>
             </p:spPr>
-            <p:style>
-              <a:lnRef idx="1">
-                <a:schemeClr val="accent1"/>
-              </a:lnRef>
-              <a:fillRef idx="0">
-                <a:schemeClr val="accent1"/>
-              </a:fillRef>
-              <a:effectRef idx="0">
-                <a:schemeClr val="accent1"/>
-              </a:effectRef>
-              <a:fontRef idx="minor">
-                <a:schemeClr val="tx1"/>
-              </a:fontRef>
-            </p:style>
-          </p:cxnSp>
-          <p:cxnSp>
-            <p:nvCxnSpPr>
-              <p:cNvPr id="46" name="Straight Connector 45">
-                <a:extLst>
-                  <a:ext uri="{FF2B5EF4-FFF2-40B4-BE49-F238E27FC236}">
-                    <a16:creationId xmlns:a16="http://schemas.microsoft.com/office/drawing/2014/main" id="{90537F94-A8B1-D9D7-51A8-EC61DE7C6F67}"/>
-                  </a:ext>
-                </a:extLst>
-              </p:cNvPr>
-              <p:cNvCxnSpPr>
-                <a:cxnSpLocks/>
-              </p:cNvCxnSpPr>
-              <p:nvPr/>
-            </p:nvCxnSpPr>
-            <p:spPr>
-              <a:xfrm flipV="1">
-                <a:off x="9191185" y="1081296"/>
-                <a:ext cx="123568" cy="67819"/>
-              </a:xfrm>
-              <a:prstGeom prst="line">
-                <a:avLst/>
-              </a:prstGeom>
-              <a:ln w="28575">
-                <a:solidFill>
-                  <a:srgbClr val="65875A"/>
-                </a:solidFill>
-              </a:ln>
-            </p:spPr>
-            <p:style>
-              <a:lnRef idx="1">
-                <a:schemeClr val="accent1"/>
-              </a:lnRef>
-              <a:fillRef idx="0">
-                <a:schemeClr val="accent1"/>
-              </a:fillRef>
-              <a:effectRef idx="0">
-                <a:schemeClr val="accent1"/>
-              </a:effectRef>
-              <a:fontRef idx="minor">
-                <a:schemeClr val="tx1"/>
-              </a:fontRef>
-            </p:style>
-          </p:cxnSp>
-          <p:cxnSp>
-            <p:nvCxnSpPr>
-              <p:cNvPr id="47" name="Straight Connector 46">
-                <a:extLst>
-                  <a:ext uri="{FF2B5EF4-FFF2-40B4-BE49-F238E27FC236}">
-                    <a16:creationId xmlns:a16="http://schemas.microsoft.com/office/drawing/2014/main" id="{173E5AC3-75B2-F24A-93AA-959711704C0D}"/>
-                  </a:ext>
-                </a:extLst>
-              </p:cNvPr>
-              <p:cNvCxnSpPr>
-                <a:cxnSpLocks/>
-              </p:cNvCxnSpPr>
-              <p:nvPr/>
-            </p:nvCxnSpPr>
-            <p:spPr>
-              <a:xfrm flipV="1">
-                <a:off x="9191185" y="1081296"/>
-                <a:ext cx="282246" cy="141959"/>
-              </a:xfrm>
-              <a:prstGeom prst="line">
-                <a:avLst/>
-              </a:prstGeom>
-              <a:ln w="28575">
-                <a:solidFill>
-                  <a:srgbClr val="65875A"/>
-                </a:solidFill>
-              </a:ln>
-            </p:spPr>
-            <p:style>
-              <a:lnRef idx="1">
-                <a:schemeClr val="accent1"/>
-              </a:lnRef>
-              <a:fillRef idx="0">
-                <a:schemeClr val="accent1"/>
-              </a:fillRef>
-              <a:effectRef idx="0">
-                <a:schemeClr val="accent1"/>
-              </a:effectRef>
-              <a:fontRef idx="minor">
-                <a:schemeClr val="tx1"/>
-              </a:fontRef>
-            </p:style>
-          </p:cxnSp>
-          <p:cxnSp>
-            <p:nvCxnSpPr>
-              <p:cNvPr id="48" name="Straight Connector 47">
-                <a:extLst>
-                  <a:ext uri="{FF2B5EF4-FFF2-40B4-BE49-F238E27FC236}">
-                    <a16:creationId xmlns:a16="http://schemas.microsoft.com/office/drawing/2014/main" id="{4D4408D6-28F2-2B2C-70E0-F8A0D20C073C}"/>
-                  </a:ext>
-                </a:extLst>
-              </p:cNvPr>
-              <p:cNvCxnSpPr>
-                <a:cxnSpLocks/>
-              </p:cNvCxnSpPr>
-              <p:nvPr/>
-            </p:nvCxnSpPr>
-            <p:spPr>
-              <a:xfrm flipV="1">
-                <a:off x="9191185" y="1173354"/>
-                <a:ext cx="282246" cy="141959"/>
-              </a:xfrm>
-              <a:prstGeom prst="line">
-                <a:avLst/>
-              </a:prstGeom>
-              <a:ln w="28575">
-                <a:solidFill>
-                  <a:srgbClr val="65875A"/>
-                </a:solidFill>
-              </a:ln>
-            </p:spPr>
-            <p:style>
-              <a:lnRef idx="1">
-                <a:schemeClr val="accent1"/>
-              </a:lnRef>
-              <a:fillRef idx="0">
-                <a:schemeClr val="accent1"/>
-              </a:fillRef>
-              <a:effectRef idx="0">
-                <a:schemeClr val="accent1"/>
-              </a:effectRef>
-              <a:fontRef idx="minor">
-                <a:schemeClr val="tx1"/>
-              </a:fontRef>
-            </p:style>
-          </p:cxnSp>
+          </p:pic>
         </p:grpSp>
       </p:grpSp>
     </p:spTree>

</xml_diff>

<commit_message>
updated figs 2 and 3 exluding any lakes that have dWL outside of our range
</commit_message>
<xml_diff>
--- a/Figures/Figure2/fig 2 formatting.pptx
+++ b/Figures/Figure2/fig 2 formatting.pptx
@@ -259,7 +259,7 @@
           <a:p>
             <a:fld id="{9C50F785-C80D-4A53-AFFE-8911002EEBDB}" type="datetimeFigureOut">
               <a:rPr lang="en-US" smtClean="0"/>
-              <a:t>8/8/2024</a:t>
+              <a:t>8/30/2024</a:t>
             </a:fld>
             <a:endParaRPr lang="en-US"/>
           </a:p>
@@ -457,7 +457,7 @@
           <a:p>
             <a:fld id="{9C50F785-C80D-4A53-AFFE-8911002EEBDB}" type="datetimeFigureOut">
               <a:rPr lang="en-US" smtClean="0"/>
-              <a:t>8/8/2024</a:t>
+              <a:t>8/30/2024</a:t>
             </a:fld>
             <a:endParaRPr lang="en-US"/>
           </a:p>
@@ -665,7 +665,7 @@
           <a:p>
             <a:fld id="{9C50F785-C80D-4A53-AFFE-8911002EEBDB}" type="datetimeFigureOut">
               <a:rPr lang="en-US" smtClean="0"/>
-              <a:t>8/8/2024</a:t>
+              <a:t>8/30/2024</a:t>
             </a:fld>
             <a:endParaRPr lang="en-US"/>
           </a:p>
@@ -863,7 +863,7 @@
           <a:p>
             <a:fld id="{9C50F785-C80D-4A53-AFFE-8911002EEBDB}" type="datetimeFigureOut">
               <a:rPr lang="en-US" smtClean="0"/>
-              <a:t>8/8/2024</a:t>
+              <a:t>8/30/2024</a:t>
             </a:fld>
             <a:endParaRPr lang="en-US"/>
           </a:p>
@@ -1138,7 +1138,7 @@
           <a:p>
             <a:fld id="{9C50F785-C80D-4A53-AFFE-8911002EEBDB}" type="datetimeFigureOut">
               <a:rPr lang="en-US" smtClean="0"/>
-              <a:t>8/8/2024</a:t>
+              <a:t>8/30/2024</a:t>
             </a:fld>
             <a:endParaRPr lang="en-US"/>
           </a:p>
@@ -1403,7 +1403,7 @@
           <a:p>
             <a:fld id="{9C50F785-C80D-4A53-AFFE-8911002EEBDB}" type="datetimeFigureOut">
               <a:rPr lang="en-US" smtClean="0"/>
-              <a:t>8/8/2024</a:t>
+              <a:t>8/30/2024</a:t>
             </a:fld>
             <a:endParaRPr lang="en-US"/>
           </a:p>
@@ -1815,7 +1815,7 @@
           <a:p>
             <a:fld id="{9C50F785-C80D-4A53-AFFE-8911002EEBDB}" type="datetimeFigureOut">
               <a:rPr lang="en-US" smtClean="0"/>
-              <a:t>8/8/2024</a:t>
+              <a:t>8/30/2024</a:t>
             </a:fld>
             <a:endParaRPr lang="en-US"/>
           </a:p>
@@ -1956,7 +1956,7 @@
           <a:p>
             <a:fld id="{9C50F785-C80D-4A53-AFFE-8911002EEBDB}" type="datetimeFigureOut">
               <a:rPr lang="en-US" smtClean="0"/>
-              <a:t>8/8/2024</a:t>
+              <a:t>8/30/2024</a:t>
             </a:fld>
             <a:endParaRPr lang="en-US"/>
           </a:p>
@@ -2069,7 +2069,7 @@
           <a:p>
             <a:fld id="{9C50F785-C80D-4A53-AFFE-8911002EEBDB}" type="datetimeFigureOut">
               <a:rPr lang="en-US" smtClean="0"/>
-              <a:t>8/8/2024</a:t>
+              <a:t>8/30/2024</a:t>
             </a:fld>
             <a:endParaRPr lang="en-US"/>
           </a:p>
@@ -2380,7 +2380,7 @@
           <a:p>
             <a:fld id="{9C50F785-C80D-4A53-AFFE-8911002EEBDB}" type="datetimeFigureOut">
               <a:rPr lang="en-US" smtClean="0"/>
-              <a:t>8/8/2024</a:t>
+              <a:t>8/30/2024</a:t>
             </a:fld>
             <a:endParaRPr lang="en-US"/>
           </a:p>
@@ -2668,7 +2668,7 @@
           <a:p>
             <a:fld id="{9C50F785-C80D-4A53-AFFE-8911002EEBDB}" type="datetimeFigureOut">
               <a:rPr lang="en-US" smtClean="0"/>
-              <a:t>8/8/2024</a:t>
+              <a:t>8/30/2024</a:t>
             </a:fld>
             <a:endParaRPr lang="en-US"/>
           </a:p>
@@ -2909,7 +2909,7 @@
           <a:p>
             <a:fld id="{9C50F785-C80D-4A53-AFFE-8911002EEBDB}" type="datetimeFigureOut">
               <a:rPr lang="en-US" smtClean="0"/>
-              <a:t>8/8/2024</a:t>
+              <a:t>8/30/2024</a:t>
             </a:fld>
             <a:endParaRPr lang="en-US"/>
           </a:p>
@@ -3340,10 +3340,10 @@
         </p:nvGrpSpPr>
         <p:grpSpPr>
           <a:xfrm>
-            <a:off x="-6102" y="-2701"/>
-            <a:ext cx="11726228" cy="7086604"/>
-            <a:chOff x="-6102" y="-2701"/>
-            <a:chExt cx="11726228" cy="7086604"/>
+            <a:off x="57847" y="224118"/>
+            <a:ext cx="11617456" cy="6633882"/>
+            <a:chOff x="102670" y="71719"/>
+            <a:chExt cx="11617456" cy="6633882"/>
           </a:xfrm>
         </p:grpSpPr>
         <p:pic>
@@ -3395,10 +3395,10 @@
           </p:nvGrpSpPr>
           <p:grpSpPr>
             <a:xfrm>
-              <a:off x="-6102" y="-2701"/>
-              <a:ext cx="11726228" cy="7086604"/>
-              <a:chOff x="-6102" y="-2701"/>
-              <a:chExt cx="11726228" cy="7086604"/>
+              <a:off x="102670" y="71719"/>
+              <a:ext cx="11617456" cy="6633882"/>
+              <a:chOff x="102670" y="71719"/>
+              <a:chExt cx="11617456" cy="6633882"/>
             </a:xfrm>
           </p:grpSpPr>
           <p:grpSp>
@@ -3415,10 +3415,10 @@
             </p:nvGrpSpPr>
             <p:grpSpPr>
               <a:xfrm>
-                <a:off x="-6102" y="-2701"/>
-                <a:ext cx="11726228" cy="7086604"/>
-                <a:chOff x="-6102" y="-2701"/>
-                <a:chExt cx="11726228" cy="7086604"/>
+                <a:off x="102670" y="71719"/>
+                <a:ext cx="11617456" cy="6633882"/>
+                <a:chOff x="102670" y="71719"/>
+                <a:chExt cx="11617456" cy="6633882"/>
               </a:xfrm>
             </p:grpSpPr>
             <p:grpSp>
@@ -3435,10 +3435,10 @@
               </p:nvGrpSpPr>
               <p:grpSpPr>
                 <a:xfrm>
-                  <a:off x="-6102" y="-2701"/>
-                  <a:ext cx="11726228" cy="7086604"/>
-                  <a:chOff x="-6102" y="-2701"/>
-                  <a:chExt cx="11726228" cy="7086604"/>
+                  <a:off x="102670" y="71719"/>
+                  <a:ext cx="11617456" cy="6633882"/>
+                  <a:chOff x="102670" y="71719"/>
+                  <a:chExt cx="11617456" cy="6633882"/>
                 </a:xfrm>
               </p:grpSpPr>
               <p:pic>
@@ -3455,7 +3455,7 @@
                   </p:cNvPicPr>
                   <p:nvPr/>
                 </p:nvPicPr>
-                <p:blipFill>
+                <p:blipFill rotWithShape="1">
                   <a:blip r:embed="rId3">
                     <a:clrChange>
                       <a:clrFrom>
@@ -3473,13 +3473,13 @@
                       </a:ext>
                     </a:extLst>
                   </a:blip>
-                  <a:srcRect/>
+                  <a:srcRect l="1591" t="2625" r="1446" b="3764"/>
                   <a:stretch/>
                 </p:blipFill>
                 <p:spPr>
                   <a:xfrm>
-                    <a:off x="-6102" y="-2701"/>
-                    <a:ext cx="9448805" cy="7086604"/>
+                    <a:off x="102670" y="71719"/>
+                    <a:ext cx="9161929" cy="6633882"/>
                   </a:xfrm>
                   <a:prstGeom prst="rect">
                     <a:avLst/>
@@ -3513,7 +3513,7 @@
                 </p:blipFill>
                 <p:spPr>
                   <a:xfrm>
-                    <a:off x="2241639" y="3429000"/>
+                    <a:off x="2178886" y="3293495"/>
                     <a:ext cx="3340867" cy="2312907"/>
                   </a:xfrm>
                   <a:prstGeom prst="rect">

</xml_diff>